<commit_message>
new project and update
</commit_message>
<xml_diff>
--- a/Presentation/Internship_Oscar_Veldman.pptx
+++ b/Presentation/Internship_Oscar_Veldman.pptx
@@ -298,7 +298,7 @@
           <a:p>
             <a:fld id="{48A87A34-81AB-432B-8DAE-1953F412C126}" type="datetimeFigureOut">
               <a:rPr lang="en-US" dirty="0"/>
-              <a:t>1/17/2017</a:t>
+              <a:t>1/18/2017</a:t>
             </a:fld>
             <a:endParaRPr lang="en-US" dirty="0"/>
           </a:p>
@@ -560,7 +560,7 @@
           <a:p>
             <a:fld id="{48A87A34-81AB-432B-8DAE-1953F412C126}" type="datetimeFigureOut">
               <a:rPr lang="en-US" dirty="0"/>
-              <a:t>1/17/2017</a:t>
+              <a:t>1/18/2017</a:t>
             </a:fld>
             <a:endParaRPr lang="en-US" dirty="0"/>
           </a:p>
@@ -787,7 +787,7 @@
             <a:fld id="{48A87A34-81AB-432B-8DAE-1953F412C126}" type="datetimeFigureOut">
               <a:rPr lang="en-US" dirty="0"/>
               <a:pPr/>
-              <a:t>1/17/2017</a:t>
+              <a:t>1/18/2017</a:t>
             </a:fld>
             <a:endParaRPr lang="en-US" dirty="0"/>
           </a:p>
@@ -1093,7 +1093,7 @@
             <a:fld id="{48A87A34-81AB-432B-8DAE-1953F412C126}" type="datetimeFigureOut">
               <a:rPr lang="en-US" dirty="0"/>
               <a:pPr/>
-              <a:t>1/17/2017</a:t>
+              <a:t>1/18/2017</a:t>
             </a:fld>
             <a:endParaRPr lang="en-US" dirty="0"/>
           </a:p>
@@ -1562,7 +1562,7 @@
             <a:fld id="{48A87A34-81AB-432B-8DAE-1953F412C126}" type="datetimeFigureOut">
               <a:rPr lang="en-US" dirty="0"/>
               <a:pPr/>
-              <a:t>1/17/2017</a:t>
+              <a:t>1/18/2017</a:t>
             </a:fld>
             <a:endParaRPr lang="en-US" dirty="0"/>
           </a:p>
@@ -2104,7 +2104,7 @@
           <a:p>
             <a:fld id="{48A87A34-81AB-432B-8DAE-1953F412C126}" type="datetimeFigureOut">
               <a:rPr lang="en-US" dirty="0"/>
-              <a:t>1/17/2017</a:t>
+              <a:t>1/18/2017</a:t>
             </a:fld>
             <a:endParaRPr lang="en-US" dirty="0"/>
           </a:p>
@@ -2873,7 +2873,7 @@
           <a:p>
             <a:fld id="{48A87A34-81AB-432B-8DAE-1953F412C126}" type="datetimeFigureOut">
               <a:rPr lang="en-US" dirty="0"/>
-              <a:t>1/17/2017</a:t>
+              <a:t>1/18/2017</a:t>
             </a:fld>
             <a:endParaRPr lang="en-US" dirty="0"/>
           </a:p>
@@ -3043,7 +3043,7 @@
           <a:p>
             <a:fld id="{48A87A34-81AB-432B-8DAE-1953F412C126}" type="datetimeFigureOut">
               <a:rPr lang="en-US" dirty="0"/>
-              <a:t>1/17/2017</a:t>
+              <a:t>1/18/2017</a:t>
             </a:fld>
             <a:endParaRPr lang="en-US" dirty="0"/>
           </a:p>
@@ -3262,7 +3262,7 @@
             <a:fld id="{48A87A34-81AB-432B-8DAE-1953F412C126}" type="datetimeFigureOut">
               <a:rPr lang="en-US" dirty="0"/>
               <a:pPr/>
-              <a:t>1/17/2017</a:t>
+              <a:t>1/18/2017</a:t>
             </a:fld>
             <a:endParaRPr lang="en-US" dirty="0"/>
           </a:p>
@@ -3437,7 +3437,7 @@
           <a:p>
             <a:fld id="{48A87A34-81AB-432B-8DAE-1953F412C126}" type="datetimeFigureOut">
               <a:rPr lang="en-US" dirty="0"/>
-              <a:t>1/17/2017</a:t>
+              <a:t>1/18/2017</a:t>
             </a:fld>
             <a:endParaRPr lang="en-US" dirty="0"/>
           </a:p>
@@ -3722,7 +3722,7 @@
             <a:fld id="{48A87A34-81AB-432B-8DAE-1953F412C126}" type="datetimeFigureOut">
               <a:rPr lang="en-US" dirty="0"/>
               <a:pPr/>
-              <a:t>1/17/2017</a:t>
+              <a:t>1/18/2017</a:t>
             </a:fld>
             <a:endParaRPr lang="en-US" dirty="0"/>
           </a:p>
@@ -3959,7 +3959,7 @@
           <a:p>
             <a:fld id="{48A87A34-81AB-432B-8DAE-1953F412C126}" type="datetimeFigureOut">
               <a:rPr lang="en-US" dirty="0"/>
-              <a:t>1/17/2017</a:t>
+              <a:t>1/18/2017</a:t>
             </a:fld>
             <a:endParaRPr lang="en-US" dirty="0"/>
           </a:p>
@@ -4333,7 +4333,7 @@
           <a:p>
             <a:fld id="{48A87A34-81AB-432B-8DAE-1953F412C126}" type="datetimeFigureOut">
               <a:rPr lang="en-US" dirty="0"/>
-              <a:t>1/17/2017</a:t>
+              <a:t>1/18/2017</a:t>
             </a:fld>
             <a:endParaRPr lang="en-US" dirty="0"/>
           </a:p>
@@ -4446,7 +4446,7 @@
           <a:p>
             <a:fld id="{48A87A34-81AB-432B-8DAE-1953F412C126}" type="datetimeFigureOut">
               <a:rPr lang="en-US" dirty="0"/>
-              <a:t>1/17/2017</a:t>
+              <a:t>1/18/2017</a:t>
             </a:fld>
             <a:endParaRPr lang="en-US" dirty="0"/>
           </a:p>
@@ -4536,7 +4536,7 @@
           <a:p>
             <a:fld id="{48A87A34-81AB-432B-8DAE-1953F412C126}" type="datetimeFigureOut">
               <a:rPr lang="en-US" dirty="0"/>
-              <a:t>1/17/2017</a:t>
+              <a:t>1/18/2017</a:t>
             </a:fld>
             <a:endParaRPr lang="en-US" dirty="0"/>
           </a:p>
@@ -4780,7 +4780,7 @@
           <a:p>
             <a:fld id="{48A87A34-81AB-432B-8DAE-1953F412C126}" type="datetimeFigureOut">
               <a:rPr lang="en-US" dirty="0"/>
-              <a:t>1/17/2017</a:t>
+              <a:t>1/18/2017</a:t>
             </a:fld>
             <a:endParaRPr lang="en-US" dirty="0"/>
           </a:p>
@@ -5032,7 +5032,7 @@
           <a:p>
             <a:fld id="{48A87A34-81AB-432B-8DAE-1953F412C126}" type="datetimeFigureOut">
               <a:rPr lang="en-US" dirty="0"/>
-              <a:t>1/17/2017</a:t>
+              <a:t>1/18/2017</a:t>
             </a:fld>
             <a:endParaRPr lang="en-US" dirty="0"/>
           </a:p>
@@ -5271,7 +5271,7 @@
             <a:fld id="{48A87A34-81AB-432B-8DAE-1953F412C126}" type="datetimeFigureOut">
               <a:rPr lang="en-US" dirty="0"/>
               <a:pPr/>
-              <a:t>1/17/2017</a:t>
+              <a:t>1/18/2017</a:t>
             </a:fld>
             <a:endParaRPr lang="en-US" dirty="0"/>
           </a:p>
@@ -6461,7 +6461,7 @@
           <a:p>
             <a:r>
               <a:rPr lang="en-US" dirty="0"/>
-              <a:t>Questions or comments?</a:t>
+              <a:t>Any questions or comments?</a:t>
             </a:r>
             <a:endParaRPr lang="nl-NL" dirty="0"/>
           </a:p>

</xml_diff>